<commit_message>
Moving stuff here and there
</commit_message>
<xml_diff>
--- a/figs/chord/chord.pptx
+++ b/figs/chord/chord.pptx
@@ -105,6 +105,11 @@
       </a:defRPr>
     </a:lvl9pPr>
   </p:defaultTextStyle>
+  <p:extLst>
+    <p:ext uri="{EFAFB233-063F-42B5-8137-9DF3F51BA10A}">
+      <p15:sldGuideLst xmlns:p15="http://schemas.microsoft.com/office/powerpoint/2012/main"/>
+    </p:ext>
+  </p:extLst>
 </p:presentation>
 </file>
 
@@ -239,7 +244,7 @@
           <a:p>
             <a:fld id="{B141880C-12A7-8548-8F4A-325AFAA66268}" type="datetimeFigureOut">
               <a:rPr lang="en-TW" smtClean="0"/>
-              <a:t>2025/2/11</a:t>
+              <a:t>2025/2/15</a:t>
             </a:fld>
             <a:endParaRPr lang="en-TW"/>
           </a:p>
@@ -409,7 +414,7 @@
           <a:p>
             <a:fld id="{B141880C-12A7-8548-8F4A-325AFAA66268}" type="datetimeFigureOut">
               <a:rPr lang="en-TW" smtClean="0"/>
-              <a:t>2025/2/11</a:t>
+              <a:t>2025/2/15</a:t>
             </a:fld>
             <a:endParaRPr lang="en-TW"/>
           </a:p>
@@ -589,7 +594,7 @@
           <a:p>
             <a:fld id="{B141880C-12A7-8548-8F4A-325AFAA66268}" type="datetimeFigureOut">
               <a:rPr lang="en-TW" smtClean="0"/>
-              <a:t>2025/2/11</a:t>
+              <a:t>2025/2/15</a:t>
             </a:fld>
             <a:endParaRPr lang="en-TW"/>
           </a:p>
@@ -759,7 +764,7 @@
           <a:p>
             <a:fld id="{B141880C-12A7-8548-8F4A-325AFAA66268}" type="datetimeFigureOut">
               <a:rPr lang="en-TW" smtClean="0"/>
-              <a:t>2025/2/11</a:t>
+              <a:t>2025/2/15</a:t>
             </a:fld>
             <a:endParaRPr lang="en-TW"/>
           </a:p>
@@ -1005,7 +1010,7 @@
           <a:p>
             <a:fld id="{B141880C-12A7-8548-8F4A-325AFAA66268}" type="datetimeFigureOut">
               <a:rPr lang="en-TW" smtClean="0"/>
-              <a:t>2025/2/11</a:t>
+              <a:t>2025/2/15</a:t>
             </a:fld>
             <a:endParaRPr lang="en-TW"/>
           </a:p>
@@ -1237,7 +1242,7 @@
           <a:p>
             <a:fld id="{B141880C-12A7-8548-8F4A-325AFAA66268}" type="datetimeFigureOut">
               <a:rPr lang="en-TW" smtClean="0"/>
-              <a:t>2025/2/11</a:t>
+              <a:t>2025/2/15</a:t>
             </a:fld>
             <a:endParaRPr lang="en-TW"/>
           </a:p>
@@ -1604,7 +1609,7 @@
           <a:p>
             <a:fld id="{B141880C-12A7-8548-8F4A-325AFAA66268}" type="datetimeFigureOut">
               <a:rPr lang="en-TW" smtClean="0"/>
-              <a:t>2025/2/11</a:t>
+              <a:t>2025/2/15</a:t>
             </a:fld>
             <a:endParaRPr lang="en-TW"/>
           </a:p>
@@ -1722,7 +1727,7 @@
           <a:p>
             <a:fld id="{B141880C-12A7-8548-8F4A-325AFAA66268}" type="datetimeFigureOut">
               <a:rPr lang="en-TW" smtClean="0"/>
-              <a:t>2025/2/11</a:t>
+              <a:t>2025/2/15</a:t>
             </a:fld>
             <a:endParaRPr lang="en-TW"/>
           </a:p>
@@ -1817,7 +1822,7 @@
           <a:p>
             <a:fld id="{B141880C-12A7-8548-8F4A-325AFAA66268}" type="datetimeFigureOut">
               <a:rPr lang="en-TW" smtClean="0"/>
-              <a:t>2025/2/11</a:t>
+              <a:t>2025/2/15</a:t>
             </a:fld>
             <a:endParaRPr lang="en-TW"/>
           </a:p>
@@ -2094,7 +2099,7 @@
           <a:p>
             <a:fld id="{B141880C-12A7-8548-8F4A-325AFAA66268}" type="datetimeFigureOut">
               <a:rPr lang="en-TW" smtClean="0"/>
-              <a:t>2025/2/11</a:t>
+              <a:t>2025/2/15</a:t>
             </a:fld>
             <a:endParaRPr lang="en-TW"/>
           </a:p>
@@ -2351,7 +2356,7 @@
           <a:p>
             <a:fld id="{B141880C-12A7-8548-8F4A-325AFAA66268}" type="datetimeFigureOut">
               <a:rPr lang="en-TW" smtClean="0"/>
-              <a:t>2025/2/11</a:t>
+              <a:t>2025/2/15</a:t>
             </a:fld>
             <a:endParaRPr lang="en-TW"/>
           </a:p>
@@ -2564,7 +2569,7 @@
           <a:p>
             <a:fld id="{B141880C-12A7-8548-8F4A-325AFAA66268}" type="datetimeFigureOut">
               <a:rPr lang="en-TW" smtClean="0"/>
-              <a:t>2025/2/11</a:t>
+              <a:t>2025/2/15</a:t>
             </a:fld>
             <a:endParaRPr lang="en-TW"/>
           </a:p>
@@ -2969,885 +2974,6 @@
           <a:chExt cx="0" cy="0"/>
         </a:xfrm>
       </p:grpSpPr>
-      <p:pic>
-        <p:nvPicPr>
-          <p:cNvPr id="37" name="Picture 36" descr="A diagram of a number of cells&#10;&#10;AI-generated content may be incorrect.">
-            <a:extLst>
-              <a:ext uri="{FF2B5EF4-FFF2-40B4-BE49-F238E27FC236}">
-                <a16:creationId xmlns:a16="http://schemas.microsoft.com/office/drawing/2014/main" id="{87632BC2-803E-B512-77A6-28400192E721}"/>
-              </a:ext>
-            </a:extLst>
-          </p:cNvPr>
-          <p:cNvPicPr>
-            <a:picLocks noChangeAspect="1"/>
-          </p:cNvPicPr>
-          <p:nvPr/>
-        </p:nvPicPr>
-        <p:blipFill>
-          <a:blip r:embed="rId2"/>
-          <a:stretch>
-            <a:fillRect/>
-          </a:stretch>
-        </p:blipFill>
-        <p:spPr>
-          <a:xfrm>
-            <a:off x="834807" y="801017"/>
-            <a:ext cx="6140006" cy="3911778"/>
-          </a:xfrm>
-          <a:prstGeom prst="rect">
-            <a:avLst/>
-          </a:prstGeom>
-        </p:spPr>
-      </p:pic>
-      <p:pic>
-        <p:nvPicPr>
-          <p:cNvPr id="39" name="Picture 38" descr="A diagram of a number of different types of data&#10;&#10;AI-generated content may be incorrect.">
-            <a:extLst>
-              <a:ext uri="{FF2B5EF4-FFF2-40B4-BE49-F238E27FC236}">
-                <a16:creationId xmlns:a16="http://schemas.microsoft.com/office/drawing/2014/main" id="{C218A199-51F4-725D-CBDD-2EC2426EF16C}"/>
-              </a:ext>
-            </a:extLst>
-          </p:cNvPr>
-          <p:cNvPicPr>
-            <a:picLocks noChangeAspect="1"/>
-          </p:cNvPicPr>
-          <p:nvPr/>
-        </p:nvPicPr>
-        <p:blipFill>
-          <a:blip r:embed="rId3"/>
-          <a:stretch>
-            <a:fillRect/>
-          </a:stretch>
-        </p:blipFill>
-        <p:spPr>
-          <a:xfrm>
-            <a:off x="834807" y="5302908"/>
-            <a:ext cx="6292911" cy="4009193"/>
-          </a:xfrm>
-          <a:prstGeom prst="rect">
-            <a:avLst/>
-          </a:prstGeom>
-        </p:spPr>
-      </p:pic>
-      <p:pic>
-        <p:nvPicPr>
-          <p:cNvPr id="10" name="Picture 9">
-            <a:extLst>
-              <a:ext uri="{FF2B5EF4-FFF2-40B4-BE49-F238E27FC236}">
-                <a16:creationId xmlns:a16="http://schemas.microsoft.com/office/drawing/2014/main" id="{54653222-9A56-F093-AAF1-368497248982}"/>
-              </a:ext>
-            </a:extLst>
-          </p:cNvPr>
-          <p:cNvPicPr>
-            <a:picLocks noChangeAspect="1"/>
-          </p:cNvPicPr>
-          <p:nvPr/>
-        </p:nvPicPr>
-        <p:blipFill>
-          <a:blip r:embed="rId4"/>
-          <a:stretch>
-            <a:fillRect/>
-          </a:stretch>
-        </p:blipFill>
-        <p:spPr>
-          <a:xfrm>
-            <a:off x="1493250" y="3888200"/>
-            <a:ext cx="800100" cy="660400"/>
-          </a:xfrm>
-          <a:prstGeom prst="rect">
-            <a:avLst/>
-          </a:prstGeom>
-        </p:spPr>
-      </p:pic>
-      <p:pic>
-        <p:nvPicPr>
-          <p:cNvPr id="11" name="Picture 10">
-            <a:extLst>
-              <a:ext uri="{FF2B5EF4-FFF2-40B4-BE49-F238E27FC236}">
-                <a16:creationId xmlns:a16="http://schemas.microsoft.com/office/drawing/2014/main" id="{3B84E531-D1DC-3AC1-C36F-9AB090E1DAD5}"/>
-              </a:ext>
-            </a:extLst>
-          </p:cNvPr>
-          <p:cNvPicPr>
-            <a:picLocks noChangeAspect="1"/>
-          </p:cNvPicPr>
-          <p:nvPr/>
-        </p:nvPicPr>
-        <p:blipFill>
-          <a:blip r:embed="rId5"/>
-          <a:stretch>
-            <a:fillRect/>
-          </a:stretch>
-        </p:blipFill>
-        <p:spPr>
-          <a:xfrm>
-            <a:off x="1493250" y="8189933"/>
-            <a:ext cx="800100" cy="699186"/>
-          </a:xfrm>
-          <a:prstGeom prst="rect">
-            <a:avLst/>
-          </a:prstGeom>
-        </p:spPr>
-      </p:pic>
-      <p:pic>
-        <p:nvPicPr>
-          <p:cNvPr id="12" name="Picture 11">
-            <a:extLst>
-              <a:ext uri="{FF2B5EF4-FFF2-40B4-BE49-F238E27FC236}">
-                <a16:creationId xmlns:a16="http://schemas.microsoft.com/office/drawing/2014/main" id="{30E78B5E-9F0D-CDDF-DA71-8869C5AC2997}"/>
-              </a:ext>
-            </a:extLst>
-          </p:cNvPr>
-          <p:cNvPicPr>
-            <a:picLocks noChangeAspect="1"/>
-          </p:cNvPicPr>
-          <p:nvPr/>
-        </p:nvPicPr>
-        <p:blipFill>
-          <a:blip r:embed="rId6"/>
-          <a:stretch>
-            <a:fillRect/>
-          </a:stretch>
-        </p:blipFill>
-        <p:spPr>
-          <a:xfrm>
-            <a:off x="1493250" y="12545653"/>
-            <a:ext cx="803320" cy="699186"/>
-          </a:xfrm>
-          <a:prstGeom prst="rect">
-            <a:avLst/>
-          </a:prstGeom>
-        </p:spPr>
-      </p:pic>
-      <p:sp>
-        <p:nvSpPr>
-          <p:cNvPr id="13" name="TextBox 12">
-            <a:extLst>
-              <a:ext uri="{FF2B5EF4-FFF2-40B4-BE49-F238E27FC236}">
-                <a16:creationId xmlns:a16="http://schemas.microsoft.com/office/drawing/2014/main" id="{7E8A6DB7-66F7-4DBE-4931-E803D0CF9221}"/>
-              </a:ext>
-            </a:extLst>
-          </p:cNvPr>
-          <p:cNvSpPr txBox="1"/>
-          <p:nvPr/>
-        </p:nvSpPr>
-        <p:spPr>
-          <a:xfrm>
-            <a:off x="1493250" y="539407"/>
-            <a:ext cx="606862" cy="523220"/>
-          </a:xfrm>
-          <a:prstGeom prst="rect">
-            <a:avLst/>
-          </a:prstGeom>
-          <a:noFill/>
-        </p:spPr>
-        <p:txBody>
-          <a:bodyPr wrap="square" rtlCol="0">
-            <a:spAutoFit/>
-          </a:bodyPr>
-          <a:lstStyle/>
-          <a:p>
-            <a:r>
-              <a:rPr lang="en-TW" sz="2800" b="1" dirty="0">
-                <a:latin typeface="Helvetica" pitchFamily="2" charset="0"/>
-              </a:rPr>
-              <a:t>A</a:t>
-            </a:r>
-          </a:p>
-        </p:txBody>
-      </p:sp>
-      <p:sp>
-        <p:nvSpPr>
-          <p:cNvPr id="14" name="TextBox 13">
-            <a:extLst>
-              <a:ext uri="{FF2B5EF4-FFF2-40B4-BE49-F238E27FC236}">
-                <a16:creationId xmlns:a16="http://schemas.microsoft.com/office/drawing/2014/main" id="{805BAD7D-D3DE-D481-6F08-C488FA8775C8}"/>
-              </a:ext>
-            </a:extLst>
-          </p:cNvPr>
-          <p:cNvSpPr txBox="1"/>
-          <p:nvPr/>
-        </p:nvSpPr>
-        <p:spPr>
-          <a:xfrm>
-            <a:off x="1493250" y="4856842"/>
-            <a:ext cx="606862" cy="523220"/>
-          </a:xfrm>
-          <a:prstGeom prst="rect">
-            <a:avLst/>
-          </a:prstGeom>
-          <a:noFill/>
-        </p:spPr>
-        <p:txBody>
-          <a:bodyPr wrap="square" rtlCol="0">
-            <a:spAutoFit/>
-          </a:bodyPr>
-          <a:lstStyle/>
-          <a:p>
-            <a:r>
-              <a:rPr lang="en-TW" sz="2800" b="1" dirty="0">
-                <a:latin typeface="Helvetica" pitchFamily="2" charset="0"/>
-              </a:rPr>
-              <a:t>B</a:t>
-            </a:r>
-          </a:p>
-        </p:txBody>
-      </p:sp>
-      <p:sp>
-        <p:nvSpPr>
-          <p:cNvPr id="15" name="TextBox 14">
-            <a:extLst>
-              <a:ext uri="{FF2B5EF4-FFF2-40B4-BE49-F238E27FC236}">
-                <a16:creationId xmlns:a16="http://schemas.microsoft.com/office/drawing/2014/main" id="{8D271CC4-7E47-1518-3B00-04F7F579C23D}"/>
-              </a:ext>
-            </a:extLst>
-          </p:cNvPr>
-          <p:cNvSpPr txBox="1"/>
-          <p:nvPr/>
-        </p:nvSpPr>
-        <p:spPr>
-          <a:xfrm>
-            <a:off x="1493250" y="9090653"/>
-            <a:ext cx="606862" cy="523220"/>
-          </a:xfrm>
-          <a:prstGeom prst="rect">
-            <a:avLst/>
-          </a:prstGeom>
-          <a:noFill/>
-        </p:spPr>
-        <p:txBody>
-          <a:bodyPr wrap="square" rtlCol="0">
-            <a:spAutoFit/>
-          </a:bodyPr>
-          <a:lstStyle/>
-          <a:p>
-            <a:r>
-              <a:rPr lang="en-TW" sz="2800" b="1" dirty="0">
-                <a:latin typeface="Helvetica" pitchFamily="2" charset="0"/>
-              </a:rPr>
-              <a:t>C</a:t>
-            </a:r>
-          </a:p>
-        </p:txBody>
-      </p:sp>
-      <p:sp>
-        <p:nvSpPr>
-          <p:cNvPr id="42" name="TextBox 41">
-            <a:extLst>
-              <a:ext uri="{FF2B5EF4-FFF2-40B4-BE49-F238E27FC236}">
-                <a16:creationId xmlns:a16="http://schemas.microsoft.com/office/drawing/2014/main" id="{F3D10182-FD6C-D661-2D61-C82B9DFA5B08}"/>
-              </a:ext>
-            </a:extLst>
-          </p:cNvPr>
-          <p:cNvSpPr txBox="1"/>
-          <p:nvPr/>
-        </p:nvSpPr>
-        <p:spPr>
-          <a:xfrm rot="18739500">
-            <a:off x="4400511" y="975809"/>
-            <a:ext cx="1828185" cy="338554"/>
-          </a:xfrm>
-          <a:prstGeom prst="rect">
-            <a:avLst/>
-          </a:prstGeom>
-          <a:solidFill>
-            <a:schemeClr val="bg1"/>
-          </a:solidFill>
-        </p:spPr>
-        <p:txBody>
-          <a:bodyPr wrap="square" rtlCol="0">
-            <a:spAutoFit/>
-          </a:bodyPr>
-          <a:lstStyle/>
-          <a:p>
-            <a:r>
-              <a:rPr lang="en-US" sz="800" dirty="0"/>
-              <a:t>Cytokine production involved </a:t>
-            </a:r>
-          </a:p>
-          <a:p>
-            <a:r>
-              <a:rPr lang="en-US" sz="800" dirty="0"/>
-              <a:t>in immune response</a:t>
-            </a:r>
-            <a:endParaRPr lang="en-TW" sz="800" dirty="0"/>
-          </a:p>
-        </p:txBody>
-      </p:sp>
-      <p:sp>
-        <p:nvSpPr>
-          <p:cNvPr id="43" name="TextBox 42">
-            <a:extLst>
-              <a:ext uri="{FF2B5EF4-FFF2-40B4-BE49-F238E27FC236}">
-                <a16:creationId xmlns:a16="http://schemas.microsoft.com/office/drawing/2014/main" id="{48355F40-DC9A-92C5-B85B-6AEE7E3ACC6B}"/>
-              </a:ext>
-            </a:extLst>
-          </p:cNvPr>
-          <p:cNvSpPr txBox="1"/>
-          <p:nvPr/>
-        </p:nvSpPr>
-        <p:spPr>
-          <a:xfrm rot="20869884">
-            <a:off x="5073384" y="2093514"/>
-            <a:ext cx="2257967" cy="338554"/>
-          </a:xfrm>
-          <a:prstGeom prst="rect">
-            <a:avLst/>
-          </a:prstGeom>
-          <a:solidFill>
-            <a:schemeClr val="bg1"/>
-          </a:solidFill>
-        </p:spPr>
-        <p:txBody>
-          <a:bodyPr wrap="square" rtlCol="0">
-            <a:spAutoFit/>
-          </a:bodyPr>
-          <a:lstStyle/>
-          <a:p>
-            <a:r>
-              <a:rPr lang="en-US" sz="800" dirty="0"/>
-              <a:t>Positive regulation of cytokine production </a:t>
-            </a:r>
-          </a:p>
-          <a:p>
-            <a:r>
-              <a:rPr lang="en-US" sz="800" dirty="0"/>
-              <a:t>involved in immune response</a:t>
-            </a:r>
-          </a:p>
-        </p:txBody>
-      </p:sp>
-      <p:sp>
-        <p:nvSpPr>
-          <p:cNvPr id="44" name="TextBox 43">
-            <a:extLst>
-              <a:ext uri="{FF2B5EF4-FFF2-40B4-BE49-F238E27FC236}">
-                <a16:creationId xmlns:a16="http://schemas.microsoft.com/office/drawing/2014/main" id="{B97C60B9-7AF6-5B84-30B3-AF9692898735}"/>
-              </a:ext>
-            </a:extLst>
-          </p:cNvPr>
-          <p:cNvSpPr txBox="1"/>
-          <p:nvPr/>
-        </p:nvSpPr>
-        <p:spPr>
-          <a:xfrm rot="495182">
-            <a:off x="5126222" y="3023423"/>
-            <a:ext cx="2828619" cy="215444"/>
-          </a:xfrm>
-          <a:prstGeom prst="rect">
-            <a:avLst/>
-          </a:prstGeom>
-          <a:solidFill>
-            <a:schemeClr val="bg1"/>
-          </a:solidFill>
-        </p:spPr>
-        <p:txBody>
-          <a:bodyPr wrap="square" rtlCol="0">
-            <a:spAutoFit/>
-          </a:bodyPr>
-          <a:lstStyle/>
-          <a:p>
-            <a:r>
-              <a:rPr lang="en-US" sz="800" dirty="0"/>
-              <a:t>Positive regulation of interleukin 6 production</a:t>
-            </a:r>
-          </a:p>
-        </p:txBody>
-      </p:sp>
-      <p:sp>
-        <p:nvSpPr>
-          <p:cNvPr id="45" name="TextBox 44">
-            <a:extLst>
-              <a:ext uri="{FF2B5EF4-FFF2-40B4-BE49-F238E27FC236}">
-                <a16:creationId xmlns:a16="http://schemas.microsoft.com/office/drawing/2014/main" id="{6F9FDCD7-C534-C319-7F90-9FACBA35C8CB}"/>
-              </a:ext>
-            </a:extLst>
-          </p:cNvPr>
-          <p:cNvSpPr txBox="1"/>
-          <p:nvPr/>
-        </p:nvSpPr>
-        <p:spPr>
-          <a:xfrm rot="1709595">
-            <a:off x="4813223" y="3869703"/>
-            <a:ext cx="2828619" cy="338554"/>
-          </a:xfrm>
-          <a:prstGeom prst="rect">
-            <a:avLst/>
-          </a:prstGeom>
-          <a:solidFill>
-            <a:schemeClr val="bg1"/>
-          </a:solidFill>
-        </p:spPr>
-        <p:txBody>
-          <a:bodyPr wrap="square" rtlCol="0">
-            <a:spAutoFit/>
-          </a:bodyPr>
-          <a:lstStyle/>
-          <a:p>
-            <a:r>
-              <a:rPr lang="en-US" sz="800" dirty="0"/>
-              <a:t>Tumor necrosis factor superfamily</a:t>
-            </a:r>
-          </a:p>
-          <a:p>
-            <a:r>
-              <a:rPr lang="en-US" sz="800" dirty="0"/>
-              <a:t>cytokine production</a:t>
-            </a:r>
-          </a:p>
-        </p:txBody>
-      </p:sp>
-      <p:sp>
-        <p:nvSpPr>
-          <p:cNvPr id="46" name="TextBox 45">
-            <a:extLst>
-              <a:ext uri="{FF2B5EF4-FFF2-40B4-BE49-F238E27FC236}">
-                <a16:creationId xmlns:a16="http://schemas.microsoft.com/office/drawing/2014/main" id="{FD3938F1-081F-3E59-F0A3-7FB042FF03DA}"/>
-              </a:ext>
-            </a:extLst>
-          </p:cNvPr>
-          <p:cNvSpPr txBox="1"/>
-          <p:nvPr/>
-        </p:nvSpPr>
-        <p:spPr>
-          <a:xfrm rot="3072216">
-            <a:off x="4453758" y="4027854"/>
-            <a:ext cx="991516" cy="215444"/>
-          </a:xfrm>
-          <a:prstGeom prst="rect">
-            <a:avLst/>
-          </a:prstGeom>
-          <a:solidFill>
-            <a:schemeClr val="bg1"/>
-          </a:solidFill>
-        </p:spPr>
-        <p:txBody>
-          <a:bodyPr wrap="square" rtlCol="0">
-            <a:spAutoFit/>
-          </a:bodyPr>
-          <a:lstStyle/>
-          <a:p>
-            <a:r>
-              <a:rPr lang="en-US" sz="800" dirty="0"/>
-              <a:t>Antigen binding</a:t>
-            </a:r>
-          </a:p>
-        </p:txBody>
-      </p:sp>
-      <p:sp>
-        <p:nvSpPr>
-          <p:cNvPr id="47" name="TextBox 46">
-            <a:extLst>
-              <a:ext uri="{FF2B5EF4-FFF2-40B4-BE49-F238E27FC236}">
-                <a16:creationId xmlns:a16="http://schemas.microsoft.com/office/drawing/2014/main" id="{851AF47B-37DC-5A10-8CA5-6068459AFA11}"/>
-              </a:ext>
-            </a:extLst>
-          </p:cNvPr>
-          <p:cNvSpPr txBox="1"/>
-          <p:nvPr/>
-        </p:nvSpPr>
-        <p:spPr>
-          <a:xfrm rot="4307947">
-            <a:off x="3885426" y="4469397"/>
-            <a:ext cx="1379567" cy="215444"/>
-          </a:xfrm>
-          <a:prstGeom prst="rect">
-            <a:avLst/>
-          </a:prstGeom>
-          <a:solidFill>
-            <a:schemeClr val="bg1"/>
-          </a:solidFill>
-        </p:spPr>
-        <p:txBody>
-          <a:bodyPr wrap="square" rtlCol="0">
-            <a:spAutoFit/>
-          </a:bodyPr>
-          <a:lstStyle/>
-          <a:p>
-            <a:r>
-              <a:rPr lang="en-US" sz="800" dirty="0"/>
-              <a:t>T-cell receptor signaling</a:t>
-            </a:r>
-            <a:endParaRPr lang="en-TW" sz="800" dirty="0"/>
-          </a:p>
-        </p:txBody>
-      </p:sp>
-      <p:sp>
-        <p:nvSpPr>
-          <p:cNvPr id="48" name="TextBox 47">
-            <a:extLst>
-              <a:ext uri="{FF2B5EF4-FFF2-40B4-BE49-F238E27FC236}">
-                <a16:creationId xmlns:a16="http://schemas.microsoft.com/office/drawing/2014/main" id="{2FC52AAB-3E67-B6F4-5F15-1EF4140C0EE5}"/>
-              </a:ext>
-            </a:extLst>
-          </p:cNvPr>
-          <p:cNvSpPr txBox="1"/>
-          <p:nvPr/>
-        </p:nvSpPr>
-        <p:spPr>
-          <a:xfrm rot="17563096">
-            <a:off x="4057988" y="5342550"/>
-            <a:ext cx="1379567" cy="338554"/>
-          </a:xfrm>
-          <a:prstGeom prst="rect">
-            <a:avLst/>
-          </a:prstGeom>
-          <a:solidFill>
-            <a:schemeClr val="bg1"/>
-          </a:solidFill>
-        </p:spPr>
-        <p:txBody>
-          <a:bodyPr wrap="square" rtlCol="0">
-            <a:spAutoFit/>
-          </a:bodyPr>
-          <a:lstStyle/>
-          <a:p>
-            <a:r>
-              <a:rPr lang="en-US" sz="800" dirty="0"/>
-              <a:t>Acute promyelocytic leukemia down</a:t>
-            </a:r>
-          </a:p>
-        </p:txBody>
-      </p:sp>
-      <p:sp>
-        <p:nvSpPr>
-          <p:cNvPr id="49" name="TextBox 48">
-            <a:extLst>
-              <a:ext uri="{FF2B5EF4-FFF2-40B4-BE49-F238E27FC236}">
-                <a16:creationId xmlns:a16="http://schemas.microsoft.com/office/drawing/2014/main" id="{EDCCA86E-2458-50DB-8EF4-3282AF6ABD4E}"/>
-              </a:ext>
-            </a:extLst>
-          </p:cNvPr>
-          <p:cNvSpPr txBox="1"/>
-          <p:nvPr/>
-        </p:nvSpPr>
-        <p:spPr>
-          <a:xfrm rot="18940401">
-            <a:off x="4712071" y="5756834"/>
-            <a:ext cx="1379567" cy="338554"/>
-          </a:xfrm>
-          <a:prstGeom prst="rect">
-            <a:avLst/>
-          </a:prstGeom>
-          <a:solidFill>
-            <a:schemeClr val="bg1"/>
-          </a:solidFill>
-        </p:spPr>
-        <p:txBody>
-          <a:bodyPr wrap="square" rtlCol="0">
-            <a:spAutoFit/>
-          </a:bodyPr>
-          <a:lstStyle/>
-          <a:p>
-            <a:r>
-              <a:rPr lang="en-US" sz="800" dirty="0"/>
-              <a:t>Production of molecular of immune response down</a:t>
-            </a:r>
-          </a:p>
-        </p:txBody>
-      </p:sp>
-      <p:sp>
-        <p:nvSpPr>
-          <p:cNvPr id="50" name="TextBox 49">
-            <a:extLst>
-              <a:ext uri="{FF2B5EF4-FFF2-40B4-BE49-F238E27FC236}">
-                <a16:creationId xmlns:a16="http://schemas.microsoft.com/office/drawing/2014/main" id="{876871C6-7D3E-33E1-8EBE-28E14E13D043}"/>
-              </a:ext>
-            </a:extLst>
-          </p:cNvPr>
-          <p:cNvSpPr txBox="1"/>
-          <p:nvPr/>
-        </p:nvSpPr>
-        <p:spPr>
-          <a:xfrm rot="20237543">
-            <a:off x="5059127" y="6229394"/>
-            <a:ext cx="2170239" cy="338554"/>
-          </a:xfrm>
-          <a:prstGeom prst="rect">
-            <a:avLst/>
-          </a:prstGeom>
-          <a:solidFill>
-            <a:schemeClr val="bg1"/>
-          </a:solidFill>
-        </p:spPr>
-        <p:txBody>
-          <a:bodyPr wrap="square" rtlCol="0">
-            <a:spAutoFit/>
-          </a:bodyPr>
-          <a:lstStyle/>
-          <a:p>
-            <a:r>
-              <a:rPr lang="en-US" sz="800" dirty="0"/>
-              <a:t>Negative production of cytokine production involved in immune response</a:t>
-            </a:r>
-          </a:p>
-        </p:txBody>
-      </p:sp>
-      <p:sp>
-        <p:nvSpPr>
-          <p:cNvPr id="51" name="TextBox 50">
-            <a:extLst>
-              <a:ext uri="{FF2B5EF4-FFF2-40B4-BE49-F238E27FC236}">
-                <a16:creationId xmlns:a16="http://schemas.microsoft.com/office/drawing/2014/main" id="{563477C5-FFED-D134-0AF8-BDA2639C78A5}"/>
-              </a:ext>
-            </a:extLst>
-          </p:cNvPr>
-          <p:cNvSpPr txBox="1"/>
-          <p:nvPr/>
-        </p:nvSpPr>
-        <p:spPr>
-          <a:xfrm rot="20672686">
-            <a:off x="5190783" y="6663465"/>
-            <a:ext cx="1816856" cy="215444"/>
-          </a:xfrm>
-          <a:prstGeom prst="rect">
-            <a:avLst/>
-          </a:prstGeom>
-          <a:solidFill>
-            <a:schemeClr val="bg1"/>
-          </a:solidFill>
-        </p:spPr>
-        <p:txBody>
-          <a:bodyPr wrap="square" rtlCol="0">
-            <a:spAutoFit/>
-          </a:bodyPr>
-          <a:lstStyle/>
-          <a:p>
-            <a:r>
-              <a:rPr lang="en-US" sz="800" dirty="0"/>
-              <a:t>Regulation of neutrophil </a:t>
-            </a:r>
-            <a:r>
-              <a:rPr lang="en-US" sz="800" dirty="0" err="1"/>
-              <a:t>cheotaxis</a:t>
-            </a:r>
-            <a:endParaRPr lang="en-US" sz="800" dirty="0"/>
-          </a:p>
-        </p:txBody>
-      </p:sp>
-      <p:sp>
-        <p:nvSpPr>
-          <p:cNvPr id="52" name="TextBox 51">
-            <a:extLst>
-              <a:ext uri="{FF2B5EF4-FFF2-40B4-BE49-F238E27FC236}">
-                <a16:creationId xmlns:a16="http://schemas.microsoft.com/office/drawing/2014/main" id="{E723B881-77B5-1257-2309-DC62F6EEA4F0}"/>
-              </a:ext>
-            </a:extLst>
-          </p:cNvPr>
-          <p:cNvSpPr txBox="1"/>
-          <p:nvPr/>
-        </p:nvSpPr>
-        <p:spPr>
-          <a:xfrm rot="21117886">
-            <a:off x="5263689" y="7032459"/>
-            <a:ext cx="1379567" cy="215444"/>
-          </a:xfrm>
-          <a:prstGeom prst="rect">
-            <a:avLst/>
-          </a:prstGeom>
-          <a:solidFill>
-            <a:schemeClr val="bg1"/>
-          </a:solidFill>
-        </p:spPr>
-        <p:txBody>
-          <a:bodyPr wrap="square" rtlCol="0">
-            <a:spAutoFit/>
-          </a:bodyPr>
-          <a:lstStyle/>
-          <a:p>
-            <a:r>
-              <a:rPr lang="en-US" sz="800" dirty="0"/>
-              <a:t>Neural tube development</a:t>
-            </a:r>
-          </a:p>
-        </p:txBody>
-      </p:sp>
-      <p:sp>
-        <p:nvSpPr>
-          <p:cNvPr id="53" name="TextBox 52">
-            <a:extLst>
-              <a:ext uri="{FF2B5EF4-FFF2-40B4-BE49-F238E27FC236}">
-                <a16:creationId xmlns:a16="http://schemas.microsoft.com/office/drawing/2014/main" id="{21F09A8B-E5B4-2ED0-C7BA-FD3052CE57A0}"/>
-              </a:ext>
-            </a:extLst>
-          </p:cNvPr>
-          <p:cNvSpPr txBox="1"/>
-          <p:nvPr/>
-        </p:nvSpPr>
-        <p:spPr>
-          <a:xfrm rot="558026">
-            <a:off x="5217934" y="7526590"/>
-            <a:ext cx="1802026" cy="338554"/>
-          </a:xfrm>
-          <a:prstGeom prst="rect">
-            <a:avLst/>
-          </a:prstGeom>
-          <a:solidFill>
-            <a:schemeClr val="bg1"/>
-          </a:solidFill>
-        </p:spPr>
-        <p:txBody>
-          <a:bodyPr wrap="square" rtlCol="0">
-            <a:spAutoFit/>
-          </a:bodyPr>
-          <a:lstStyle/>
-          <a:p>
-            <a:r>
-              <a:rPr lang="en-US" sz="800" dirty="0"/>
-              <a:t>Regulation of production of molecular of immune response</a:t>
-            </a:r>
-          </a:p>
-        </p:txBody>
-      </p:sp>
-      <p:sp>
-        <p:nvSpPr>
-          <p:cNvPr id="54" name="TextBox 53">
-            <a:extLst>
-              <a:ext uri="{FF2B5EF4-FFF2-40B4-BE49-F238E27FC236}">
-                <a16:creationId xmlns:a16="http://schemas.microsoft.com/office/drawing/2014/main" id="{631C267C-F79B-9431-A0DE-2825592428D0}"/>
-              </a:ext>
-            </a:extLst>
-          </p:cNvPr>
-          <p:cNvSpPr txBox="1"/>
-          <p:nvPr/>
-        </p:nvSpPr>
-        <p:spPr>
-          <a:xfrm rot="1333031">
-            <a:off x="5096330" y="8070354"/>
-            <a:ext cx="1971903" cy="215444"/>
-          </a:xfrm>
-          <a:prstGeom prst="rect">
-            <a:avLst/>
-          </a:prstGeom>
-          <a:solidFill>
-            <a:schemeClr val="bg1"/>
-          </a:solidFill>
-        </p:spPr>
-        <p:txBody>
-          <a:bodyPr wrap="square" rtlCol="0">
-            <a:spAutoFit/>
-          </a:bodyPr>
-          <a:lstStyle/>
-          <a:p>
-            <a:r>
-              <a:rPr lang="en-US" sz="800" dirty="0"/>
-              <a:t>Dendritic cell maturation up       </a:t>
-            </a:r>
-          </a:p>
-        </p:txBody>
-      </p:sp>
-      <p:sp>
-        <p:nvSpPr>
-          <p:cNvPr id="55" name="TextBox 54">
-            <a:extLst>
-              <a:ext uri="{FF2B5EF4-FFF2-40B4-BE49-F238E27FC236}">
-                <a16:creationId xmlns:a16="http://schemas.microsoft.com/office/drawing/2014/main" id="{2D68FB60-3ABA-86E6-65C4-6CE81361D4F9}"/>
-              </a:ext>
-            </a:extLst>
-          </p:cNvPr>
-          <p:cNvSpPr txBox="1"/>
-          <p:nvPr/>
-        </p:nvSpPr>
-        <p:spPr>
-          <a:xfrm rot="1836540">
-            <a:off x="4949339" y="8346087"/>
-            <a:ext cx="1871376" cy="215444"/>
-          </a:xfrm>
-          <a:prstGeom prst="rect">
-            <a:avLst/>
-          </a:prstGeom>
-          <a:solidFill>
-            <a:schemeClr val="bg1"/>
-          </a:solidFill>
-        </p:spPr>
-        <p:txBody>
-          <a:bodyPr wrap="square" rtlCol="0">
-            <a:spAutoFit/>
-          </a:bodyPr>
-          <a:lstStyle/>
-          <a:p>
-            <a:r>
-              <a:rPr lang="en-US" sz="800" dirty="0"/>
-              <a:t>MDM4 targets neuroepithelium down</a:t>
-            </a:r>
-          </a:p>
-        </p:txBody>
-      </p:sp>
-      <p:sp>
-        <p:nvSpPr>
-          <p:cNvPr id="56" name="TextBox 55">
-            <a:extLst>
-              <a:ext uri="{FF2B5EF4-FFF2-40B4-BE49-F238E27FC236}">
-                <a16:creationId xmlns:a16="http://schemas.microsoft.com/office/drawing/2014/main" id="{88646DB0-27ED-8A3A-0D82-D7C66B2D0163}"/>
-              </a:ext>
-            </a:extLst>
-          </p:cNvPr>
-          <p:cNvSpPr txBox="1"/>
-          <p:nvPr/>
-        </p:nvSpPr>
-        <p:spPr>
-          <a:xfrm rot="2375944">
-            <a:off x="4733541" y="8515016"/>
-            <a:ext cx="1703553" cy="338554"/>
-          </a:xfrm>
-          <a:prstGeom prst="rect">
-            <a:avLst/>
-          </a:prstGeom>
-          <a:solidFill>
-            <a:schemeClr val="bg1"/>
-          </a:solidFill>
-        </p:spPr>
-        <p:txBody>
-          <a:bodyPr wrap="square" rtlCol="0">
-            <a:spAutoFit/>
-          </a:bodyPr>
-          <a:lstStyle/>
-          <a:p>
-            <a:r>
-              <a:rPr lang="en-US" sz="800" dirty="0"/>
-              <a:t>SEMA4D-induced cell migration and growth cone collapse</a:t>
-            </a:r>
-          </a:p>
-        </p:txBody>
-      </p:sp>
-      <p:sp>
-        <p:nvSpPr>
-          <p:cNvPr id="57" name="TextBox 56">
-            <a:extLst>
-              <a:ext uri="{FF2B5EF4-FFF2-40B4-BE49-F238E27FC236}">
-                <a16:creationId xmlns:a16="http://schemas.microsoft.com/office/drawing/2014/main" id="{4B451757-E0EF-F0DB-6BCB-8480C2B4430F}"/>
-              </a:ext>
-            </a:extLst>
-          </p:cNvPr>
-          <p:cNvSpPr txBox="1"/>
-          <p:nvPr/>
-        </p:nvSpPr>
-        <p:spPr>
-          <a:xfrm rot="3662468">
-            <a:off x="4259731" y="8894298"/>
-            <a:ext cx="1379567" cy="215444"/>
-          </a:xfrm>
-          <a:prstGeom prst="rect">
-            <a:avLst/>
-          </a:prstGeom>
-          <a:solidFill>
-            <a:schemeClr val="bg1"/>
-          </a:solidFill>
-        </p:spPr>
-        <p:txBody>
-          <a:bodyPr wrap="square" rtlCol="0">
-            <a:spAutoFit/>
-          </a:bodyPr>
-          <a:lstStyle/>
-          <a:p>
-            <a:r>
-              <a:rPr lang="en-US" sz="800" dirty="0"/>
-              <a:t>MYC targets down</a:t>
-            </a:r>
-            <a:endParaRPr lang="en-TW" sz="800" dirty="0"/>
-          </a:p>
-        </p:txBody>
-      </p:sp>
       <p:grpSp>
         <p:nvGrpSpPr>
           <p:cNvPr id="61" name="Group 60">
@@ -3862,7 +2988,7 @@
         </p:nvGrpSpPr>
         <p:grpSpPr>
           <a:xfrm rot="1396659">
-            <a:off x="1493250" y="8915900"/>
+            <a:off x="915785" y="9063030"/>
             <a:ext cx="5481563" cy="4328939"/>
             <a:chOff x="1493250" y="8915900"/>
             <a:chExt cx="5481563" cy="4328939"/>
@@ -3883,7 +3009,7 @@
             <p:nvPr/>
           </p:nvPicPr>
           <p:blipFill>
-            <a:blip r:embed="rId7"/>
+            <a:blip r:embed="rId2"/>
             <a:stretch>
               <a:fillRect/>
             </a:stretch>
@@ -4010,6 +3136,952 @@
           </p:txBody>
         </p:sp>
       </p:grpSp>
+      <p:pic>
+        <p:nvPicPr>
+          <p:cNvPr id="2" name="Picture 1" descr="A network of dots and lines&#10;&#10;AI-generated content may be incorrect.">
+            <a:extLst>
+              <a:ext uri="{FF2B5EF4-FFF2-40B4-BE49-F238E27FC236}">
+                <a16:creationId xmlns:a16="http://schemas.microsoft.com/office/drawing/2014/main" id="{C309CAAB-5DDB-A590-4746-CF9A873BFDCD}"/>
+              </a:ext>
+            </a:extLst>
+          </p:cNvPr>
+          <p:cNvPicPr>
+            <a:picLocks noChangeAspect="1"/>
+          </p:cNvPicPr>
+          <p:nvPr/>
+        </p:nvPicPr>
+        <p:blipFill>
+          <a:blip r:embed="rId3"/>
+          <a:stretch>
+            <a:fillRect/>
+          </a:stretch>
+        </p:blipFill>
+        <p:spPr>
+          <a:xfrm>
+            <a:off x="6608473" y="5652056"/>
+            <a:ext cx="7772400" cy="8118104"/>
+          </a:xfrm>
+          <a:prstGeom prst="rect">
+            <a:avLst/>
+          </a:prstGeom>
+        </p:spPr>
+      </p:pic>
+      <p:pic>
+        <p:nvPicPr>
+          <p:cNvPr id="37" name="Picture 36" descr="A diagram of a number of cells&#10;&#10;AI-generated content may be incorrect.">
+            <a:extLst>
+              <a:ext uri="{FF2B5EF4-FFF2-40B4-BE49-F238E27FC236}">
+                <a16:creationId xmlns:a16="http://schemas.microsoft.com/office/drawing/2014/main" id="{87632BC2-803E-B512-77A6-28400192E721}"/>
+              </a:ext>
+            </a:extLst>
+          </p:cNvPr>
+          <p:cNvPicPr>
+            <a:picLocks noChangeAspect="1"/>
+          </p:cNvPicPr>
+          <p:nvPr/>
+        </p:nvPicPr>
+        <p:blipFill>
+          <a:blip r:embed="rId4"/>
+          <a:stretch>
+            <a:fillRect/>
+          </a:stretch>
+        </p:blipFill>
+        <p:spPr>
+          <a:xfrm>
+            <a:off x="257342" y="948147"/>
+            <a:ext cx="6140006" cy="3911778"/>
+          </a:xfrm>
+          <a:prstGeom prst="rect">
+            <a:avLst/>
+          </a:prstGeom>
+        </p:spPr>
+      </p:pic>
+      <p:pic>
+        <p:nvPicPr>
+          <p:cNvPr id="39" name="Picture 38" descr="A diagram of a number of different types of data&#10;&#10;AI-generated content may be incorrect.">
+            <a:extLst>
+              <a:ext uri="{FF2B5EF4-FFF2-40B4-BE49-F238E27FC236}">
+                <a16:creationId xmlns:a16="http://schemas.microsoft.com/office/drawing/2014/main" id="{C218A199-51F4-725D-CBDD-2EC2426EF16C}"/>
+              </a:ext>
+            </a:extLst>
+          </p:cNvPr>
+          <p:cNvPicPr>
+            <a:picLocks noChangeAspect="1"/>
+          </p:cNvPicPr>
+          <p:nvPr/>
+        </p:nvPicPr>
+        <p:blipFill>
+          <a:blip r:embed="rId5"/>
+          <a:stretch>
+            <a:fillRect/>
+          </a:stretch>
+        </p:blipFill>
+        <p:spPr>
+          <a:xfrm>
+            <a:off x="257342" y="5450038"/>
+            <a:ext cx="6292911" cy="4009193"/>
+          </a:xfrm>
+          <a:prstGeom prst="rect">
+            <a:avLst/>
+          </a:prstGeom>
+        </p:spPr>
+      </p:pic>
+      <p:pic>
+        <p:nvPicPr>
+          <p:cNvPr id="10" name="Picture 9">
+            <a:extLst>
+              <a:ext uri="{FF2B5EF4-FFF2-40B4-BE49-F238E27FC236}">
+                <a16:creationId xmlns:a16="http://schemas.microsoft.com/office/drawing/2014/main" id="{54653222-9A56-F093-AAF1-368497248982}"/>
+              </a:ext>
+            </a:extLst>
+          </p:cNvPr>
+          <p:cNvPicPr>
+            <a:picLocks noChangeAspect="1"/>
+          </p:cNvPicPr>
+          <p:nvPr/>
+        </p:nvPicPr>
+        <p:blipFill>
+          <a:blip r:embed="rId6"/>
+          <a:stretch>
+            <a:fillRect/>
+          </a:stretch>
+        </p:blipFill>
+        <p:spPr>
+          <a:xfrm>
+            <a:off x="915785" y="4035330"/>
+            <a:ext cx="800100" cy="660400"/>
+          </a:xfrm>
+          <a:prstGeom prst="rect">
+            <a:avLst/>
+          </a:prstGeom>
+        </p:spPr>
+      </p:pic>
+      <p:pic>
+        <p:nvPicPr>
+          <p:cNvPr id="11" name="Picture 10">
+            <a:extLst>
+              <a:ext uri="{FF2B5EF4-FFF2-40B4-BE49-F238E27FC236}">
+                <a16:creationId xmlns:a16="http://schemas.microsoft.com/office/drawing/2014/main" id="{3B84E531-D1DC-3AC1-C36F-9AB090E1DAD5}"/>
+              </a:ext>
+            </a:extLst>
+          </p:cNvPr>
+          <p:cNvPicPr>
+            <a:picLocks noChangeAspect="1"/>
+          </p:cNvPicPr>
+          <p:nvPr/>
+        </p:nvPicPr>
+        <p:blipFill>
+          <a:blip r:embed="rId7"/>
+          <a:stretch>
+            <a:fillRect/>
+          </a:stretch>
+        </p:blipFill>
+        <p:spPr>
+          <a:xfrm>
+            <a:off x="915785" y="8337063"/>
+            <a:ext cx="800100" cy="699186"/>
+          </a:xfrm>
+          <a:prstGeom prst="rect">
+            <a:avLst/>
+          </a:prstGeom>
+        </p:spPr>
+      </p:pic>
+      <p:pic>
+        <p:nvPicPr>
+          <p:cNvPr id="12" name="Picture 11">
+            <a:extLst>
+              <a:ext uri="{FF2B5EF4-FFF2-40B4-BE49-F238E27FC236}">
+                <a16:creationId xmlns:a16="http://schemas.microsoft.com/office/drawing/2014/main" id="{30E78B5E-9F0D-CDDF-DA71-8869C5AC2997}"/>
+              </a:ext>
+            </a:extLst>
+          </p:cNvPr>
+          <p:cNvPicPr>
+            <a:picLocks noChangeAspect="1"/>
+          </p:cNvPicPr>
+          <p:nvPr/>
+        </p:nvPicPr>
+        <p:blipFill>
+          <a:blip r:embed="rId8"/>
+          <a:stretch>
+            <a:fillRect/>
+          </a:stretch>
+        </p:blipFill>
+        <p:spPr>
+          <a:xfrm>
+            <a:off x="915785" y="12692783"/>
+            <a:ext cx="803320" cy="699186"/>
+          </a:xfrm>
+          <a:prstGeom prst="rect">
+            <a:avLst/>
+          </a:prstGeom>
+        </p:spPr>
+      </p:pic>
+      <p:sp>
+        <p:nvSpPr>
+          <p:cNvPr id="13" name="TextBox 12">
+            <a:extLst>
+              <a:ext uri="{FF2B5EF4-FFF2-40B4-BE49-F238E27FC236}">
+                <a16:creationId xmlns:a16="http://schemas.microsoft.com/office/drawing/2014/main" id="{7E8A6DB7-66F7-4DBE-4931-E803D0CF9221}"/>
+              </a:ext>
+            </a:extLst>
+          </p:cNvPr>
+          <p:cNvSpPr txBox="1"/>
+          <p:nvPr/>
+        </p:nvSpPr>
+        <p:spPr>
+          <a:xfrm>
+            <a:off x="915785" y="686537"/>
+            <a:ext cx="606862" cy="523220"/>
+          </a:xfrm>
+          <a:prstGeom prst="rect">
+            <a:avLst/>
+          </a:prstGeom>
+          <a:noFill/>
+        </p:spPr>
+        <p:txBody>
+          <a:bodyPr wrap="square" rtlCol="0">
+            <a:spAutoFit/>
+          </a:bodyPr>
+          <a:lstStyle/>
+          <a:p>
+            <a:r>
+              <a:rPr lang="en-TW" sz="2800" b="1" dirty="0">
+                <a:latin typeface="Helvetica" pitchFamily="2" charset="0"/>
+              </a:rPr>
+              <a:t>A</a:t>
+            </a:r>
+          </a:p>
+        </p:txBody>
+      </p:sp>
+      <p:sp>
+        <p:nvSpPr>
+          <p:cNvPr id="14" name="TextBox 13">
+            <a:extLst>
+              <a:ext uri="{FF2B5EF4-FFF2-40B4-BE49-F238E27FC236}">
+                <a16:creationId xmlns:a16="http://schemas.microsoft.com/office/drawing/2014/main" id="{805BAD7D-D3DE-D481-6F08-C488FA8775C8}"/>
+              </a:ext>
+            </a:extLst>
+          </p:cNvPr>
+          <p:cNvSpPr txBox="1"/>
+          <p:nvPr/>
+        </p:nvSpPr>
+        <p:spPr>
+          <a:xfrm>
+            <a:off x="915785" y="5003972"/>
+            <a:ext cx="606862" cy="523220"/>
+          </a:xfrm>
+          <a:prstGeom prst="rect">
+            <a:avLst/>
+          </a:prstGeom>
+          <a:noFill/>
+        </p:spPr>
+        <p:txBody>
+          <a:bodyPr wrap="square" rtlCol="0">
+            <a:spAutoFit/>
+          </a:bodyPr>
+          <a:lstStyle/>
+          <a:p>
+            <a:r>
+              <a:rPr lang="en-TW" sz="2800" b="1" dirty="0">
+                <a:latin typeface="Helvetica" pitchFamily="2" charset="0"/>
+              </a:rPr>
+              <a:t>B</a:t>
+            </a:r>
+          </a:p>
+        </p:txBody>
+      </p:sp>
+      <p:sp>
+        <p:nvSpPr>
+          <p:cNvPr id="15" name="TextBox 14">
+            <a:extLst>
+              <a:ext uri="{FF2B5EF4-FFF2-40B4-BE49-F238E27FC236}">
+                <a16:creationId xmlns:a16="http://schemas.microsoft.com/office/drawing/2014/main" id="{8D271CC4-7E47-1518-3B00-04F7F579C23D}"/>
+              </a:ext>
+            </a:extLst>
+          </p:cNvPr>
+          <p:cNvSpPr txBox="1"/>
+          <p:nvPr/>
+        </p:nvSpPr>
+        <p:spPr>
+          <a:xfrm>
+            <a:off x="915785" y="9237783"/>
+            <a:ext cx="606862" cy="523220"/>
+          </a:xfrm>
+          <a:prstGeom prst="rect">
+            <a:avLst/>
+          </a:prstGeom>
+          <a:noFill/>
+        </p:spPr>
+        <p:txBody>
+          <a:bodyPr wrap="square" rtlCol="0">
+            <a:spAutoFit/>
+          </a:bodyPr>
+          <a:lstStyle/>
+          <a:p>
+            <a:r>
+              <a:rPr lang="en-TW" sz="2800" b="1" dirty="0">
+                <a:latin typeface="Helvetica" pitchFamily="2" charset="0"/>
+              </a:rPr>
+              <a:t>C</a:t>
+            </a:r>
+          </a:p>
+        </p:txBody>
+      </p:sp>
+      <p:sp>
+        <p:nvSpPr>
+          <p:cNvPr id="42" name="TextBox 41">
+            <a:extLst>
+              <a:ext uri="{FF2B5EF4-FFF2-40B4-BE49-F238E27FC236}">
+                <a16:creationId xmlns:a16="http://schemas.microsoft.com/office/drawing/2014/main" id="{F3D10182-FD6C-D661-2D61-C82B9DFA5B08}"/>
+              </a:ext>
+            </a:extLst>
+          </p:cNvPr>
+          <p:cNvSpPr txBox="1"/>
+          <p:nvPr/>
+        </p:nvSpPr>
+        <p:spPr>
+          <a:xfrm rot="18739500">
+            <a:off x="3823046" y="1122939"/>
+            <a:ext cx="1828185" cy="338554"/>
+          </a:xfrm>
+          <a:prstGeom prst="rect">
+            <a:avLst/>
+          </a:prstGeom>
+          <a:solidFill>
+            <a:schemeClr val="bg1"/>
+          </a:solidFill>
+        </p:spPr>
+        <p:txBody>
+          <a:bodyPr wrap="square" rtlCol="0">
+            <a:spAutoFit/>
+          </a:bodyPr>
+          <a:lstStyle/>
+          <a:p>
+            <a:r>
+              <a:rPr lang="en-US" sz="800" dirty="0"/>
+              <a:t>Cytokine production involved </a:t>
+            </a:r>
+          </a:p>
+          <a:p>
+            <a:r>
+              <a:rPr lang="en-US" sz="800" dirty="0"/>
+              <a:t>in immune response</a:t>
+            </a:r>
+            <a:endParaRPr lang="en-TW" sz="800" dirty="0"/>
+          </a:p>
+        </p:txBody>
+      </p:sp>
+      <p:sp>
+        <p:nvSpPr>
+          <p:cNvPr id="43" name="TextBox 42">
+            <a:extLst>
+              <a:ext uri="{FF2B5EF4-FFF2-40B4-BE49-F238E27FC236}">
+                <a16:creationId xmlns:a16="http://schemas.microsoft.com/office/drawing/2014/main" id="{48355F40-DC9A-92C5-B85B-6AEE7E3ACC6B}"/>
+              </a:ext>
+            </a:extLst>
+          </p:cNvPr>
+          <p:cNvSpPr txBox="1"/>
+          <p:nvPr/>
+        </p:nvSpPr>
+        <p:spPr>
+          <a:xfrm rot="20869884">
+            <a:off x="4495919" y="2240644"/>
+            <a:ext cx="2257967" cy="338554"/>
+          </a:xfrm>
+          <a:prstGeom prst="rect">
+            <a:avLst/>
+          </a:prstGeom>
+          <a:solidFill>
+            <a:schemeClr val="bg1"/>
+          </a:solidFill>
+        </p:spPr>
+        <p:txBody>
+          <a:bodyPr wrap="square" rtlCol="0">
+            <a:spAutoFit/>
+          </a:bodyPr>
+          <a:lstStyle/>
+          <a:p>
+            <a:r>
+              <a:rPr lang="en-US" sz="800" dirty="0"/>
+              <a:t>Positive regulation of cytokine production </a:t>
+            </a:r>
+          </a:p>
+          <a:p>
+            <a:r>
+              <a:rPr lang="en-US" sz="800" dirty="0"/>
+              <a:t>involved in immune response</a:t>
+            </a:r>
+          </a:p>
+        </p:txBody>
+      </p:sp>
+      <p:sp>
+        <p:nvSpPr>
+          <p:cNvPr id="44" name="TextBox 43">
+            <a:extLst>
+              <a:ext uri="{FF2B5EF4-FFF2-40B4-BE49-F238E27FC236}">
+                <a16:creationId xmlns:a16="http://schemas.microsoft.com/office/drawing/2014/main" id="{B97C60B9-7AF6-5B84-30B3-AF9692898735}"/>
+              </a:ext>
+            </a:extLst>
+          </p:cNvPr>
+          <p:cNvSpPr txBox="1"/>
+          <p:nvPr/>
+        </p:nvSpPr>
+        <p:spPr>
+          <a:xfrm rot="495182">
+            <a:off x="4548757" y="3170553"/>
+            <a:ext cx="2828619" cy="215444"/>
+          </a:xfrm>
+          <a:prstGeom prst="rect">
+            <a:avLst/>
+          </a:prstGeom>
+          <a:solidFill>
+            <a:schemeClr val="bg1"/>
+          </a:solidFill>
+        </p:spPr>
+        <p:txBody>
+          <a:bodyPr wrap="square" rtlCol="0">
+            <a:spAutoFit/>
+          </a:bodyPr>
+          <a:lstStyle/>
+          <a:p>
+            <a:r>
+              <a:rPr lang="en-US" sz="800" dirty="0"/>
+              <a:t>Positive regulation of interleukin 6 production</a:t>
+            </a:r>
+          </a:p>
+        </p:txBody>
+      </p:sp>
+      <p:sp>
+        <p:nvSpPr>
+          <p:cNvPr id="45" name="TextBox 44">
+            <a:extLst>
+              <a:ext uri="{FF2B5EF4-FFF2-40B4-BE49-F238E27FC236}">
+                <a16:creationId xmlns:a16="http://schemas.microsoft.com/office/drawing/2014/main" id="{6F9FDCD7-C534-C319-7F90-9FACBA35C8CB}"/>
+              </a:ext>
+            </a:extLst>
+          </p:cNvPr>
+          <p:cNvSpPr txBox="1"/>
+          <p:nvPr/>
+        </p:nvSpPr>
+        <p:spPr>
+          <a:xfrm rot="1709595">
+            <a:off x="4235758" y="4016833"/>
+            <a:ext cx="2828619" cy="338554"/>
+          </a:xfrm>
+          <a:prstGeom prst="rect">
+            <a:avLst/>
+          </a:prstGeom>
+          <a:solidFill>
+            <a:schemeClr val="bg1"/>
+          </a:solidFill>
+        </p:spPr>
+        <p:txBody>
+          <a:bodyPr wrap="square" rtlCol="0">
+            <a:spAutoFit/>
+          </a:bodyPr>
+          <a:lstStyle/>
+          <a:p>
+            <a:r>
+              <a:rPr lang="en-US" sz="800" dirty="0"/>
+              <a:t>Tumor necrosis factor superfamily</a:t>
+            </a:r>
+          </a:p>
+          <a:p>
+            <a:r>
+              <a:rPr lang="en-US" sz="800" dirty="0"/>
+              <a:t>cytokine production</a:t>
+            </a:r>
+          </a:p>
+        </p:txBody>
+      </p:sp>
+      <p:sp>
+        <p:nvSpPr>
+          <p:cNvPr id="46" name="TextBox 45">
+            <a:extLst>
+              <a:ext uri="{FF2B5EF4-FFF2-40B4-BE49-F238E27FC236}">
+                <a16:creationId xmlns:a16="http://schemas.microsoft.com/office/drawing/2014/main" id="{FD3938F1-081F-3E59-F0A3-7FB042FF03DA}"/>
+              </a:ext>
+            </a:extLst>
+          </p:cNvPr>
+          <p:cNvSpPr txBox="1"/>
+          <p:nvPr/>
+        </p:nvSpPr>
+        <p:spPr>
+          <a:xfrm rot="3072216">
+            <a:off x="3876293" y="4174984"/>
+            <a:ext cx="991516" cy="215444"/>
+          </a:xfrm>
+          <a:prstGeom prst="rect">
+            <a:avLst/>
+          </a:prstGeom>
+          <a:solidFill>
+            <a:schemeClr val="bg1"/>
+          </a:solidFill>
+        </p:spPr>
+        <p:txBody>
+          <a:bodyPr wrap="square" rtlCol="0">
+            <a:spAutoFit/>
+          </a:bodyPr>
+          <a:lstStyle/>
+          <a:p>
+            <a:r>
+              <a:rPr lang="en-US" sz="800" dirty="0"/>
+              <a:t>Antigen binding</a:t>
+            </a:r>
+          </a:p>
+        </p:txBody>
+      </p:sp>
+      <p:sp>
+        <p:nvSpPr>
+          <p:cNvPr id="47" name="TextBox 46">
+            <a:extLst>
+              <a:ext uri="{FF2B5EF4-FFF2-40B4-BE49-F238E27FC236}">
+                <a16:creationId xmlns:a16="http://schemas.microsoft.com/office/drawing/2014/main" id="{851AF47B-37DC-5A10-8CA5-6068459AFA11}"/>
+              </a:ext>
+            </a:extLst>
+          </p:cNvPr>
+          <p:cNvSpPr txBox="1"/>
+          <p:nvPr/>
+        </p:nvSpPr>
+        <p:spPr>
+          <a:xfrm rot="4307947">
+            <a:off x="3307961" y="4616527"/>
+            <a:ext cx="1379567" cy="215444"/>
+          </a:xfrm>
+          <a:prstGeom prst="rect">
+            <a:avLst/>
+          </a:prstGeom>
+          <a:solidFill>
+            <a:schemeClr val="bg1"/>
+          </a:solidFill>
+        </p:spPr>
+        <p:txBody>
+          <a:bodyPr wrap="square" rtlCol="0">
+            <a:spAutoFit/>
+          </a:bodyPr>
+          <a:lstStyle/>
+          <a:p>
+            <a:r>
+              <a:rPr lang="en-US" sz="800" dirty="0"/>
+              <a:t>T-cell receptor signaling</a:t>
+            </a:r>
+            <a:endParaRPr lang="en-TW" sz="800" dirty="0"/>
+          </a:p>
+        </p:txBody>
+      </p:sp>
+      <p:sp>
+        <p:nvSpPr>
+          <p:cNvPr id="48" name="TextBox 47">
+            <a:extLst>
+              <a:ext uri="{FF2B5EF4-FFF2-40B4-BE49-F238E27FC236}">
+                <a16:creationId xmlns:a16="http://schemas.microsoft.com/office/drawing/2014/main" id="{2FC52AAB-3E67-B6F4-5F15-1EF4140C0EE5}"/>
+              </a:ext>
+            </a:extLst>
+          </p:cNvPr>
+          <p:cNvSpPr txBox="1"/>
+          <p:nvPr/>
+        </p:nvSpPr>
+        <p:spPr>
+          <a:xfrm rot="17563096">
+            <a:off x="3480523" y="5489680"/>
+            <a:ext cx="1379567" cy="338554"/>
+          </a:xfrm>
+          <a:prstGeom prst="rect">
+            <a:avLst/>
+          </a:prstGeom>
+          <a:solidFill>
+            <a:schemeClr val="bg1"/>
+          </a:solidFill>
+        </p:spPr>
+        <p:txBody>
+          <a:bodyPr wrap="square" rtlCol="0">
+            <a:spAutoFit/>
+          </a:bodyPr>
+          <a:lstStyle/>
+          <a:p>
+            <a:r>
+              <a:rPr lang="en-US" sz="800" dirty="0"/>
+              <a:t>Acute promyelocytic leukemia down</a:t>
+            </a:r>
+          </a:p>
+        </p:txBody>
+      </p:sp>
+      <p:sp>
+        <p:nvSpPr>
+          <p:cNvPr id="49" name="TextBox 48">
+            <a:extLst>
+              <a:ext uri="{FF2B5EF4-FFF2-40B4-BE49-F238E27FC236}">
+                <a16:creationId xmlns:a16="http://schemas.microsoft.com/office/drawing/2014/main" id="{EDCCA86E-2458-50DB-8EF4-3282AF6ABD4E}"/>
+              </a:ext>
+            </a:extLst>
+          </p:cNvPr>
+          <p:cNvSpPr txBox="1"/>
+          <p:nvPr/>
+        </p:nvSpPr>
+        <p:spPr>
+          <a:xfrm rot="18940401">
+            <a:off x="4134606" y="5903964"/>
+            <a:ext cx="1379567" cy="338554"/>
+          </a:xfrm>
+          <a:prstGeom prst="rect">
+            <a:avLst/>
+          </a:prstGeom>
+          <a:solidFill>
+            <a:schemeClr val="bg1"/>
+          </a:solidFill>
+        </p:spPr>
+        <p:txBody>
+          <a:bodyPr wrap="square" rtlCol="0">
+            <a:spAutoFit/>
+          </a:bodyPr>
+          <a:lstStyle/>
+          <a:p>
+            <a:r>
+              <a:rPr lang="en-US" sz="800" dirty="0"/>
+              <a:t>Production of molecular of immune response down</a:t>
+            </a:r>
+          </a:p>
+        </p:txBody>
+      </p:sp>
+      <p:sp>
+        <p:nvSpPr>
+          <p:cNvPr id="50" name="TextBox 49">
+            <a:extLst>
+              <a:ext uri="{FF2B5EF4-FFF2-40B4-BE49-F238E27FC236}">
+                <a16:creationId xmlns:a16="http://schemas.microsoft.com/office/drawing/2014/main" id="{876871C6-7D3E-33E1-8EBE-28E14E13D043}"/>
+              </a:ext>
+            </a:extLst>
+          </p:cNvPr>
+          <p:cNvSpPr txBox="1"/>
+          <p:nvPr/>
+        </p:nvSpPr>
+        <p:spPr>
+          <a:xfrm rot="20237543">
+            <a:off x="4481662" y="6376524"/>
+            <a:ext cx="2170239" cy="338554"/>
+          </a:xfrm>
+          <a:prstGeom prst="rect">
+            <a:avLst/>
+          </a:prstGeom>
+          <a:solidFill>
+            <a:schemeClr val="bg1"/>
+          </a:solidFill>
+        </p:spPr>
+        <p:txBody>
+          <a:bodyPr wrap="square" rtlCol="0">
+            <a:spAutoFit/>
+          </a:bodyPr>
+          <a:lstStyle/>
+          <a:p>
+            <a:r>
+              <a:rPr lang="en-US" sz="800" dirty="0"/>
+              <a:t>Negative production of cytokine production involved in immune response</a:t>
+            </a:r>
+          </a:p>
+        </p:txBody>
+      </p:sp>
+      <p:sp>
+        <p:nvSpPr>
+          <p:cNvPr id="51" name="TextBox 50">
+            <a:extLst>
+              <a:ext uri="{FF2B5EF4-FFF2-40B4-BE49-F238E27FC236}">
+                <a16:creationId xmlns:a16="http://schemas.microsoft.com/office/drawing/2014/main" id="{563477C5-FFED-D134-0AF8-BDA2639C78A5}"/>
+              </a:ext>
+            </a:extLst>
+          </p:cNvPr>
+          <p:cNvSpPr txBox="1"/>
+          <p:nvPr/>
+        </p:nvSpPr>
+        <p:spPr>
+          <a:xfrm rot="20672686">
+            <a:off x="4613318" y="6810595"/>
+            <a:ext cx="1816856" cy="215444"/>
+          </a:xfrm>
+          <a:prstGeom prst="rect">
+            <a:avLst/>
+          </a:prstGeom>
+          <a:solidFill>
+            <a:schemeClr val="bg1"/>
+          </a:solidFill>
+        </p:spPr>
+        <p:txBody>
+          <a:bodyPr wrap="square" rtlCol="0">
+            <a:spAutoFit/>
+          </a:bodyPr>
+          <a:lstStyle/>
+          <a:p>
+            <a:r>
+              <a:rPr lang="en-US" sz="800" dirty="0"/>
+              <a:t>Regulation of neutrophil </a:t>
+            </a:r>
+            <a:r>
+              <a:rPr lang="en-US" sz="800" dirty="0" err="1"/>
+              <a:t>cheotaxis</a:t>
+            </a:r>
+            <a:endParaRPr lang="en-US" sz="800" dirty="0"/>
+          </a:p>
+        </p:txBody>
+      </p:sp>
+      <p:sp>
+        <p:nvSpPr>
+          <p:cNvPr id="52" name="TextBox 51">
+            <a:extLst>
+              <a:ext uri="{FF2B5EF4-FFF2-40B4-BE49-F238E27FC236}">
+                <a16:creationId xmlns:a16="http://schemas.microsoft.com/office/drawing/2014/main" id="{E723B881-77B5-1257-2309-DC62F6EEA4F0}"/>
+              </a:ext>
+            </a:extLst>
+          </p:cNvPr>
+          <p:cNvSpPr txBox="1"/>
+          <p:nvPr/>
+        </p:nvSpPr>
+        <p:spPr>
+          <a:xfrm rot="21117886">
+            <a:off x="4686224" y="7179589"/>
+            <a:ext cx="1379567" cy="215444"/>
+          </a:xfrm>
+          <a:prstGeom prst="rect">
+            <a:avLst/>
+          </a:prstGeom>
+          <a:solidFill>
+            <a:schemeClr val="bg1"/>
+          </a:solidFill>
+        </p:spPr>
+        <p:txBody>
+          <a:bodyPr wrap="square" rtlCol="0">
+            <a:spAutoFit/>
+          </a:bodyPr>
+          <a:lstStyle/>
+          <a:p>
+            <a:r>
+              <a:rPr lang="en-US" sz="800" dirty="0"/>
+              <a:t>Neural tube development</a:t>
+            </a:r>
+          </a:p>
+        </p:txBody>
+      </p:sp>
+      <p:sp>
+        <p:nvSpPr>
+          <p:cNvPr id="53" name="TextBox 52">
+            <a:extLst>
+              <a:ext uri="{FF2B5EF4-FFF2-40B4-BE49-F238E27FC236}">
+                <a16:creationId xmlns:a16="http://schemas.microsoft.com/office/drawing/2014/main" id="{21F09A8B-E5B4-2ED0-C7BA-FD3052CE57A0}"/>
+              </a:ext>
+            </a:extLst>
+          </p:cNvPr>
+          <p:cNvSpPr txBox="1"/>
+          <p:nvPr/>
+        </p:nvSpPr>
+        <p:spPr>
+          <a:xfrm rot="558026">
+            <a:off x="4640469" y="7673720"/>
+            <a:ext cx="1802026" cy="338554"/>
+          </a:xfrm>
+          <a:prstGeom prst="rect">
+            <a:avLst/>
+          </a:prstGeom>
+          <a:solidFill>
+            <a:schemeClr val="bg1"/>
+          </a:solidFill>
+        </p:spPr>
+        <p:txBody>
+          <a:bodyPr wrap="square" rtlCol="0">
+            <a:spAutoFit/>
+          </a:bodyPr>
+          <a:lstStyle/>
+          <a:p>
+            <a:r>
+              <a:rPr lang="en-US" sz="800" dirty="0"/>
+              <a:t>Regulation of production of molecular of immune response</a:t>
+            </a:r>
+          </a:p>
+        </p:txBody>
+      </p:sp>
+      <p:sp>
+        <p:nvSpPr>
+          <p:cNvPr id="54" name="TextBox 53">
+            <a:extLst>
+              <a:ext uri="{FF2B5EF4-FFF2-40B4-BE49-F238E27FC236}">
+                <a16:creationId xmlns:a16="http://schemas.microsoft.com/office/drawing/2014/main" id="{631C267C-F79B-9431-A0DE-2825592428D0}"/>
+              </a:ext>
+            </a:extLst>
+          </p:cNvPr>
+          <p:cNvSpPr txBox="1"/>
+          <p:nvPr/>
+        </p:nvSpPr>
+        <p:spPr>
+          <a:xfrm rot="1333031">
+            <a:off x="4518865" y="8217484"/>
+            <a:ext cx="1971903" cy="215444"/>
+          </a:xfrm>
+          <a:prstGeom prst="rect">
+            <a:avLst/>
+          </a:prstGeom>
+          <a:solidFill>
+            <a:schemeClr val="bg1"/>
+          </a:solidFill>
+        </p:spPr>
+        <p:txBody>
+          <a:bodyPr wrap="square" rtlCol="0">
+            <a:spAutoFit/>
+          </a:bodyPr>
+          <a:lstStyle/>
+          <a:p>
+            <a:r>
+              <a:rPr lang="en-US" sz="800" dirty="0"/>
+              <a:t>Dendritic cell maturation up       </a:t>
+            </a:r>
+          </a:p>
+        </p:txBody>
+      </p:sp>
+      <p:sp>
+        <p:nvSpPr>
+          <p:cNvPr id="55" name="TextBox 54">
+            <a:extLst>
+              <a:ext uri="{FF2B5EF4-FFF2-40B4-BE49-F238E27FC236}">
+                <a16:creationId xmlns:a16="http://schemas.microsoft.com/office/drawing/2014/main" id="{2D68FB60-3ABA-86E6-65C4-6CE81361D4F9}"/>
+              </a:ext>
+            </a:extLst>
+          </p:cNvPr>
+          <p:cNvSpPr txBox="1"/>
+          <p:nvPr/>
+        </p:nvSpPr>
+        <p:spPr>
+          <a:xfrm rot="1836540">
+            <a:off x="4371874" y="8493217"/>
+            <a:ext cx="1871376" cy="215444"/>
+          </a:xfrm>
+          <a:prstGeom prst="rect">
+            <a:avLst/>
+          </a:prstGeom>
+          <a:solidFill>
+            <a:schemeClr val="bg1"/>
+          </a:solidFill>
+        </p:spPr>
+        <p:txBody>
+          <a:bodyPr wrap="square" rtlCol="0">
+            <a:spAutoFit/>
+          </a:bodyPr>
+          <a:lstStyle/>
+          <a:p>
+            <a:r>
+              <a:rPr lang="en-US" sz="800" dirty="0"/>
+              <a:t>MDM4 targets neuroepithelium down</a:t>
+            </a:r>
+          </a:p>
+        </p:txBody>
+      </p:sp>
+      <p:sp>
+        <p:nvSpPr>
+          <p:cNvPr id="56" name="TextBox 55">
+            <a:extLst>
+              <a:ext uri="{FF2B5EF4-FFF2-40B4-BE49-F238E27FC236}">
+                <a16:creationId xmlns:a16="http://schemas.microsoft.com/office/drawing/2014/main" id="{88646DB0-27ED-8A3A-0D82-D7C66B2D0163}"/>
+              </a:ext>
+            </a:extLst>
+          </p:cNvPr>
+          <p:cNvSpPr txBox="1"/>
+          <p:nvPr/>
+        </p:nvSpPr>
+        <p:spPr>
+          <a:xfrm rot="2375944">
+            <a:off x="4156076" y="8662146"/>
+            <a:ext cx="1703553" cy="338554"/>
+          </a:xfrm>
+          <a:prstGeom prst="rect">
+            <a:avLst/>
+          </a:prstGeom>
+          <a:solidFill>
+            <a:schemeClr val="bg1"/>
+          </a:solidFill>
+        </p:spPr>
+        <p:txBody>
+          <a:bodyPr wrap="square" rtlCol="0">
+            <a:spAutoFit/>
+          </a:bodyPr>
+          <a:lstStyle/>
+          <a:p>
+            <a:r>
+              <a:rPr lang="en-US" sz="800" dirty="0"/>
+              <a:t>SEMA4D-induced cell migration and growth cone collapse</a:t>
+            </a:r>
+          </a:p>
+        </p:txBody>
+      </p:sp>
+      <p:sp>
+        <p:nvSpPr>
+          <p:cNvPr id="57" name="TextBox 56">
+            <a:extLst>
+              <a:ext uri="{FF2B5EF4-FFF2-40B4-BE49-F238E27FC236}">
+                <a16:creationId xmlns:a16="http://schemas.microsoft.com/office/drawing/2014/main" id="{4B451757-E0EF-F0DB-6BCB-8480C2B4430F}"/>
+              </a:ext>
+            </a:extLst>
+          </p:cNvPr>
+          <p:cNvSpPr txBox="1"/>
+          <p:nvPr/>
+        </p:nvSpPr>
+        <p:spPr>
+          <a:xfrm rot="3662468">
+            <a:off x="3682266" y="9041428"/>
+            <a:ext cx="1379567" cy="215444"/>
+          </a:xfrm>
+          <a:prstGeom prst="rect">
+            <a:avLst/>
+          </a:prstGeom>
+          <a:solidFill>
+            <a:schemeClr val="bg1"/>
+          </a:solidFill>
+        </p:spPr>
+        <p:txBody>
+          <a:bodyPr wrap="square" rtlCol="0">
+            <a:spAutoFit/>
+          </a:bodyPr>
+          <a:lstStyle/>
+          <a:p>
+            <a:r>
+              <a:rPr lang="en-US" sz="800" dirty="0"/>
+              <a:t>MYC targets down</a:t>
+            </a:r>
+            <a:endParaRPr lang="en-TW" sz="800" dirty="0"/>
+          </a:p>
+        </p:txBody>
+      </p:sp>
+      <p:sp>
+        <p:nvSpPr>
+          <p:cNvPr id="3" name="TextBox 2">
+            <a:extLst>
+              <a:ext uri="{FF2B5EF4-FFF2-40B4-BE49-F238E27FC236}">
+                <a16:creationId xmlns:a16="http://schemas.microsoft.com/office/drawing/2014/main" id="{EFD665F2-9354-C893-D4F3-1297BC5FC2BF}"/>
+              </a:ext>
+            </a:extLst>
+          </p:cNvPr>
+          <p:cNvSpPr txBox="1"/>
+          <p:nvPr/>
+        </p:nvSpPr>
+        <p:spPr>
+          <a:xfrm>
+            <a:off x="6711712" y="5527192"/>
+            <a:ext cx="606862" cy="523220"/>
+          </a:xfrm>
+          <a:prstGeom prst="rect">
+            <a:avLst/>
+          </a:prstGeom>
+          <a:noFill/>
+        </p:spPr>
+        <p:txBody>
+          <a:bodyPr wrap="square" rtlCol="0">
+            <a:spAutoFit/>
+          </a:bodyPr>
+          <a:lstStyle/>
+          <a:p>
+            <a:r>
+              <a:rPr lang="en-TW" sz="2800" b="1" dirty="0">
+                <a:latin typeface="Helvetica" pitchFamily="2" charset="0"/>
+              </a:rPr>
+              <a:t>E</a:t>
+            </a:r>
+          </a:p>
+        </p:txBody>
+      </p:sp>
     </p:spTree>
     <p:extLst>
       <p:ext uri="{BB962C8B-B14F-4D97-AF65-F5344CB8AC3E}">

</xml_diff>